<commit_message>
updated Websites branding to Web App
</commit_message>
<xml_diff>
--- a/docs/Kudu.pptx
+++ b/docs/Kudu.pptx
@@ -26,7 +26,7 @@
     <p:sldId id="271" r:id="rId20"/>
     <p:sldId id="268" r:id="rId21"/>
     <p:sldId id="269" r:id="rId22"/>
-    <p:sldId id="270" r:id="rId23"/>
+    <p:sldId id="274" r:id="rId23"/>
     <p:sldId id="265" r:id="rId24"/>
   </p:sldIdLst>
   <p:sldSz cx="12192000" cy="6858000"/>
@@ -162,7 +162,7 @@
           <p14:sldIdLst>
             <p14:sldId id="268"/>
             <p14:sldId id="269"/>
-            <p14:sldId id="270"/>
+            <p14:sldId id="274"/>
           </p14:sldIdLst>
         </p14:section>
         <p14:section name="Conclusion" id="{9A374959-9D8B-444A-B111-CB7013E98334}">
@@ -476,10 +476,34 @@
                 <a:tableStyleId>{5C22544A-7EE6-4342-B048-85BDC9FD1C3A}</a:tableStyleId>
               </a:tblPr>
               <a:tblGrid>
-                <a:gridCol w="2764105"/>
-                <a:gridCol w="2764105"/>
-                <a:gridCol w="2764105"/>
-                <a:gridCol w="2764105"/>
+                <a:gridCol w="2764105">
+                  <a:extLst>
+                    <a:ext uri="{9D8B030D-6E8A-4147-A177-3AD203B41FA5}">
+                      <a16:colId xmlns:a16="http://schemas.microsoft.com/office/drawing/2014/main" val="20000"/>
+                    </a:ext>
+                  </a:extLst>
+                </a:gridCol>
+                <a:gridCol w="2764105">
+                  <a:extLst>
+                    <a:ext uri="{9D8B030D-6E8A-4147-A177-3AD203B41FA5}">
+                      <a16:colId xmlns:a16="http://schemas.microsoft.com/office/drawing/2014/main" val="20001"/>
+                    </a:ext>
+                  </a:extLst>
+                </a:gridCol>
+                <a:gridCol w="2764105">
+                  <a:extLst>
+                    <a:ext uri="{9D8B030D-6E8A-4147-A177-3AD203B41FA5}">
+                      <a16:colId xmlns:a16="http://schemas.microsoft.com/office/drawing/2014/main" val="20002"/>
+                    </a:ext>
+                  </a:extLst>
+                </a:gridCol>
+                <a:gridCol w="2764105">
+                  <a:extLst>
+                    <a:ext uri="{9D8B030D-6E8A-4147-A177-3AD203B41FA5}">
+                      <a16:colId xmlns:a16="http://schemas.microsoft.com/office/drawing/2014/main" val="20003"/>
+                    </a:ext>
+                  </a:extLst>
+                </a:gridCol>
               </a:tblGrid>
               <a:tr h="644435">
                 <a:tc>
@@ -654,6 +678,11 @@
                     </a:lnBlToTr>
                   </a:tcPr>
                 </a:tc>
+                <a:extLst>
+                  <a:ext uri="{0D108BD9-81ED-4DB2-BD59-A6C34878D82A}">
+                    <a16:rowId xmlns:a16="http://schemas.microsoft.com/office/drawing/2014/main" val="10000"/>
+                  </a:ext>
+                </a:extLst>
               </a:tr>
               <a:tr h="1225319">
                 <a:tc>
@@ -885,6 +914,11 @@
                     </a:lnBlToTr>
                   </a:tcPr>
                 </a:tc>
+                <a:extLst>
+                  <a:ext uri="{0D108BD9-81ED-4DB2-BD59-A6C34878D82A}">
+                    <a16:rowId xmlns:a16="http://schemas.microsoft.com/office/drawing/2014/main" val="10001"/>
+                  </a:ext>
+                </a:extLst>
               </a:tr>
               <a:tr h="1225319">
                 <a:tc>
@@ -1135,6 +1169,11 @@
                     </a:lnBlToTr>
                   </a:tcPr>
                 </a:tc>
+                <a:extLst>
+                  <a:ext uri="{0D108BD9-81ED-4DB2-BD59-A6C34878D82A}">
+                    <a16:rowId xmlns:a16="http://schemas.microsoft.com/office/drawing/2014/main" val="10002"/>
+                  </a:ext>
+                </a:extLst>
               </a:tr>
               <a:tr h="1225319">
                 <a:tc>
@@ -1385,6 +1424,11 @@
                     </a:lnBlToTr>
                   </a:tcPr>
                 </a:tc>
+                <a:extLst>
+                  <a:ext uri="{0D108BD9-81ED-4DB2-BD59-A6C34878D82A}">
+                    <a16:rowId xmlns:a16="http://schemas.microsoft.com/office/drawing/2014/main" val="10003"/>
+                  </a:ext>
+                </a:extLst>
               </a:tr>
             </a:tbl>
           </a:graphicData>
@@ -2785,10 +2829,34 @@
                 <a:tableStyleId>{93296810-A885-4BE3-A3E7-6D5BEEA58F35}</a:tableStyleId>
               </a:tblPr>
               <a:tblGrid>
-                <a:gridCol w="2764105"/>
-                <a:gridCol w="2764105"/>
-                <a:gridCol w="2764105"/>
-                <a:gridCol w="2764105"/>
+                <a:gridCol w="2764105">
+                  <a:extLst>
+                    <a:ext uri="{9D8B030D-6E8A-4147-A177-3AD203B41FA5}">
+                      <a16:colId xmlns:a16="http://schemas.microsoft.com/office/drawing/2014/main" val="20000"/>
+                    </a:ext>
+                  </a:extLst>
+                </a:gridCol>
+                <a:gridCol w="2764105">
+                  <a:extLst>
+                    <a:ext uri="{9D8B030D-6E8A-4147-A177-3AD203B41FA5}">
+                      <a16:colId xmlns:a16="http://schemas.microsoft.com/office/drawing/2014/main" val="20001"/>
+                    </a:ext>
+                  </a:extLst>
+                </a:gridCol>
+                <a:gridCol w="2764105">
+                  <a:extLst>
+                    <a:ext uri="{9D8B030D-6E8A-4147-A177-3AD203B41FA5}">
+                      <a16:colId xmlns:a16="http://schemas.microsoft.com/office/drawing/2014/main" val="20002"/>
+                    </a:ext>
+                  </a:extLst>
+                </a:gridCol>
+                <a:gridCol w="2764105">
+                  <a:extLst>
+                    <a:ext uri="{9D8B030D-6E8A-4147-A177-3AD203B41FA5}">
+                      <a16:colId xmlns:a16="http://schemas.microsoft.com/office/drawing/2014/main" val="20003"/>
+                    </a:ext>
+                  </a:extLst>
+                </a:gridCol>
               </a:tblGrid>
               <a:tr h="644435">
                 <a:tc>
@@ -2947,6 +3015,11 @@
                     </a:lnBlToTr>
                   </a:tcPr>
                 </a:tc>
+                <a:extLst>
+                  <a:ext uri="{0D108BD9-81ED-4DB2-BD59-A6C34878D82A}">
+                    <a16:rowId xmlns:a16="http://schemas.microsoft.com/office/drawing/2014/main" val="10000"/>
+                  </a:ext>
+                </a:extLst>
               </a:tr>
               <a:tr h="1225319">
                 <a:tc>
@@ -3162,6 +3235,11 @@
                     </a:lnBlToTr>
                   </a:tcPr>
                 </a:tc>
+                <a:extLst>
+                  <a:ext uri="{0D108BD9-81ED-4DB2-BD59-A6C34878D82A}">
+                    <a16:rowId xmlns:a16="http://schemas.microsoft.com/office/drawing/2014/main" val="10001"/>
+                  </a:ext>
+                </a:extLst>
               </a:tr>
               <a:tr h="1225319">
                 <a:tc>
@@ -3396,6 +3474,11 @@
                     </a:lnBlToTr>
                   </a:tcPr>
                 </a:tc>
+                <a:extLst>
+                  <a:ext uri="{0D108BD9-81ED-4DB2-BD59-A6C34878D82A}">
+                    <a16:rowId xmlns:a16="http://schemas.microsoft.com/office/drawing/2014/main" val="10002"/>
+                  </a:ext>
+                </a:extLst>
               </a:tr>
               <a:tr h="1225319">
                 <a:tc>
@@ -3630,6 +3713,11 @@
                     </a:lnBlToTr>
                   </a:tcPr>
                 </a:tc>
+                <a:extLst>
+                  <a:ext uri="{0D108BD9-81ED-4DB2-BD59-A6C34878D82A}">
+                    <a16:rowId xmlns:a16="http://schemas.microsoft.com/office/drawing/2014/main" val="10003"/>
+                  </a:ext>
+                </a:extLst>
               </a:tr>
             </a:tbl>
           </a:graphicData>
@@ -4737,10 +4825,34 @@
                 <a:tableStyleId>{21E4AEA4-8DFA-4A89-87EB-49C32662AFE0}</a:tableStyleId>
               </a:tblPr>
               <a:tblGrid>
-                <a:gridCol w="2764105"/>
-                <a:gridCol w="2764105"/>
-                <a:gridCol w="2764105"/>
-                <a:gridCol w="2764105"/>
+                <a:gridCol w="2764105">
+                  <a:extLst>
+                    <a:ext uri="{9D8B030D-6E8A-4147-A177-3AD203B41FA5}">
+                      <a16:colId xmlns:a16="http://schemas.microsoft.com/office/drawing/2014/main" val="20000"/>
+                    </a:ext>
+                  </a:extLst>
+                </a:gridCol>
+                <a:gridCol w="2764105">
+                  <a:extLst>
+                    <a:ext uri="{9D8B030D-6E8A-4147-A177-3AD203B41FA5}">
+                      <a16:colId xmlns:a16="http://schemas.microsoft.com/office/drawing/2014/main" val="20001"/>
+                    </a:ext>
+                  </a:extLst>
+                </a:gridCol>
+                <a:gridCol w="2764105">
+                  <a:extLst>
+                    <a:ext uri="{9D8B030D-6E8A-4147-A177-3AD203B41FA5}">
+                      <a16:colId xmlns:a16="http://schemas.microsoft.com/office/drawing/2014/main" val="20002"/>
+                    </a:ext>
+                  </a:extLst>
+                </a:gridCol>
+                <a:gridCol w="2764105">
+                  <a:extLst>
+                    <a:ext uri="{9D8B030D-6E8A-4147-A177-3AD203B41FA5}">
+                      <a16:colId xmlns:a16="http://schemas.microsoft.com/office/drawing/2014/main" val="20003"/>
+                    </a:ext>
+                  </a:extLst>
+                </a:gridCol>
               </a:tblGrid>
               <a:tr h="644435">
                 <a:tc>
@@ -4911,6 +5023,11 @@
                     </a:solidFill>
                   </a:tcPr>
                 </a:tc>
+                <a:extLst>
+                  <a:ext uri="{0D108BD9-81ED-4DB2-BD59-A6C34878D82A}">
+                    <a16:rowId xmlns:a16="http://schemas.microsoft.com/office/drawing/2014/main" val="10000"/>
+                  </a:ext>
+                </a:extLst>
               </a:tr>
               <a:tr h="1225319">
                 <a:tc>
@@ -5138,6 +5255,11 @@
                     </a:solidFill>
                   </a:tcPr>
                 </a:tc>
+                <a:extLst>
+                  <a:ext uri="{0D108BD9-81ED-4DB2-BD59-A6C34878D82A}">
+                    <a16:rowId xmlns:a16="http://schemas.microsoft.com/office/drawing/2014/main" val="10001"/>
+                  </a:ext>
+                </a:extLst>
               </a:tr>
               <a:tr h="1225319">
                 <a:tc>
@@ -5392,6 +5514,11 @@
                     </a:solidFill>
                   </a:tcPr>
                 </a:tc>
+                <a:extLst>
+                  <a:ext uri="{0D108BD9-81ED-4DB2-BD59-A6C34878D82A}">
+                    <a16:rowId xmlns:a16="http://schemas.microsoft.com/office/drawing/2014/main" val="10002"/>
+                  </a:ext>
+                </a:extLst>
               </a:tr>
               <a:tr h="1225319">
                 <a:tc>
@@ -5638,6 +5765,11 @@
                     </a:solidFill>
                   </a:tcPr>
                 </a:tc>
+                <a:extLst>
+                  <a:ext uri="{0D108BD9-81ED-4DB2-BD59-A6C34878D82A}">
+                    <a16:rowId xmlns:a16="http://schemas.microsoft.com/office/drawing/2014/main" val="10003"/>
+                  </a:ext>
+                </a:extLst>
               </a:tr>
             </a:tbl>
           </a:graphicData>
@@ -6850,10 +6982,34 @@
                 <a:tableStyleId>{5C22544A-7EE6-4342-B048-85BDC9FD1C3A}</a:tableStyleId>
               </a:tblPr>
               <a:tblGrid>
-                <a:gridCol w="2764105"/>
-                <a:gridCol w="2764105"/>
-                <a:gridCol w="2764105"/>
-                <a:gridCol w="2764105"/>
+                <a:gridCol w="2764105">
+                  <a:extLst>
+                    <a:ext uri="{9D8B030D-6E8A-4147-A177-3AD203B41FA5}">
+                      <a16:colId xmlns:a16="http://schemas.microsoft.com/office/drawing/2014/main" val="20000"/>
+                    </a:ext>
+                  </a:extLst>
+                </a:gridCol>
+                <a:gridCol w="2764105">
+                  <a:extLst>
+                    <a:ext uri="{9D8B030D-6E8A-4147-A177-3AD203B41FA5}">
+                      <a16:colId xmlns:a16="http://schemas.microsoft.com/office/drawing/2014/main" val="20001"/>
+                    </a:ext>
+                  </a:extLst>
+                </a:gridCol>
+                <a:gridCol w="2764105">
+                  <a:extLst>
+                    <a:ext uri="{9D8B030D-6E8A-4147-A177-3AD203B41FA5}">
+                      <a16:colId xmlns:a16="http://schemas.microsoft.com/office/drawing/2014/main" val="20002"/>
+                    </a:ext>
+                  </a:extLst>
+                </a:gridCol>
+                <a:gridCol w="2764105">
+                  <a:extLst>
+                    <a:ext uri="{9D8B030D-6E8A-4147-A177-3AD203B41FA5}">
+                      <a16:colId xmlns:a16="http://schemas.microsoft.com/office/drawing/2014/main" val="20003"/>
+                    </a:ext>
+                  </a:extLst>
+                </a:gridCol>
               </a:tblGrid>
               <a:tr h="644435">
                 <a:tc>
@@ -7028,6 +7184,11 @@
                     </a:lnBlToTr>
                   </a:tcPr>
                 </a:tc>
+                <a:extLst>
+                  <a:ext uri="{0D108BD9-81ED-4DB2-BD59-A6C34878D82A}">
+                    <a16:rowId xmlns:a16="http://schemas.microsoft.com/office/drawing/2014/main" val="10000"/>
+                  </a:ext>
+                </a:extLst>
               </a:tr>
               <a:tr h="1225319">
                 <a:tc>
@@ -7259,6 +7420,11 @@
                     </a:lnBlToTr>
                   </a:tcPr>
                 </a:tc>
+                <a:extLst>
+                  <a:ext uri="{0D108BD9-81ED-4DB2-BD59-A6C34878D82A}">
+                    <a16:rowId xmlns:a16="http://schemas.microsoft.com/office/drawing/2014/main" val="10001"/>
+                  </a:ext>
+                </a:extLst>
               </a:tr>
               <a:tr h="1225319">
                 <a:tc>
@@ -7509,6 +7675,11 @@
                     </a:lnBlToTr>
                   </a:tcPr>
                 </a:tc>
+                <a:extLst>
+                  <a:ext uri="{0D108BD9-81ED-4DB2-BD59-A6C34878D82A}">
+                    <a16:rowId xmlns:a16="http://schemas.microsoft.com/office/drawing/2014/main" val="10002"/>
+                  </a:ext>
+                </a:extLst>
               </a:tr>
               <a:tr h="1225319">
                 <a:tc>
@@ -7759,6 +7930,11 @@
                     </a:lnBlToTr>
                   </a:tcPr>
                 </a:tc>
+                <a:extLst>
+                  <a:ext uri="{0D108BD9-81ED-4DB2-BD59-A6C34878D82A}">
+                    <a16:rowId xmlns:a16="http://schemas.microsoft.com/office/drawing/2014/main" val="10003"/>
+                  </a:ext>
+                </a:extLst>
               </a:tr>
             </a:tbl>
           </a:graphicData>
@@ -8971,10 +9147,34 @@
                 <a:tableStyleId>{5C22544A-7EE6-4342-B048-85BDC9FD1C3A}</a:tableStyleId>
               </a:tblPr>
               <a:tblGrid>
-                <a:gridCol w="2764105"/>
-                <a:gridCol w="2764105"/>
-                <a:gridCol w="2764105"/>
-                <a:gridCol w="2764105"/>
+                <a:gridCol w="2764105">
+                  <a:extLst>
+                    <a:ext uri="{9D8B030D-6E8A-4147-A177-3AD203B41FA5}">
+                      <a16:colId xmlns:a16="http://schemas.microsoft.com/office/drawing/2014/main" val="20000"/>
+                    </a:ext>
+                  </a:extLst>
+                </a:gridCol>
+                <a:gridCol w="2764105">
+                  <a:extLst>
+                    <a:ext uri="{9D8B030D-6E8A-4147-A177-3AD203B41FA5}">
+                      <a16:colId xmlns:a16="http://schemas.microsoft.com/office/drawing/2014/main" val="20001"/>
+                    </a:ext>
+                  </a:extLst>
+                </a:gridCol>
+                <a:gridCol w="2764105">
+                  <a:extLst>
+                    <a:ext uri="{9D8B030D-6E8A-4147-A177-3AD203B41FA5}">
+                      <a16:colId xmlns:a16="http://schemas.microsoft.com/office/drawing/2014/main" val="20002"/>
+                    </a:ext>
+                  </a:extLst>
+                </a:gridCol>
+                <a:gridCol w="2764105">
+                  <a:extLst>
+                    <a:ext uri="{9D8B030D-6E8A-4147-A177-3AD203B41FA5}">
+                      <a16:colId xmlns:a16="http://schemas.microsoft.com/office/drawing/2014/main" val="20003"/>
+                    </a:ext>
+                  </a:extLst>
+                </a:gridCol>
               </a:tblGrid>
               <a:tr h="644435">
                 <a:tc>
@@ -9149,6 +9349,11 @@
                     </a:lnBlToTr>
                   </a:tcPr>
                 </a:tc>
+                <a:extLst>
+                  <a:ext uri="{0D108BD9-81ED-4DB2-BD59-A6C34878D82A}">
+                    <a16:rowId xmlns:a16="http://schemas.microsoft.com/office/drawing/2014/main" val="10000"/>
+                  </a:ext>
+                </a:extLst>
               </a:tr>
               <a:tr h="1225319">
                 <a:tc>
@@ -9380,6 +9585,11 @@
                     </a:lnBlToTr>
                   </a:tcPr>
                 </a:tc>
+                <a:extLst>
+                  <a:ext uri="{0D108BD9-81ED-4DB2-BD59-A6C34878D82A}">
+                    <a16:rowId xmlns:a16="http://schemas.microsoft.com/office/drawing/2014/main" val="10001"/>
+                  </a:ext>
+                </a:extLst>
               </a:tr>
               <a:tr h="1225319">
                 <a:tc>
@@ -9630,6 +9840,11 @@
                     </a:lnBlToTr>
                   </a:tcPr>
                 </a:tc>
+                <a:extLst>
+                  <a:ext uri="{0D108BD9-81ED-4DB2-BD59-A6C34878D82A}">
+                    <a16:rowId xmlns:a16="http://schemas.microsoft.com/office/drawing/2014/main" val="10002"/>
+                  </a:ext>
+                </a:extLst>
               </a:tr>
               <a:tr h="1225319">
                 <a:tc>
@@ -9880,6 +10095,11 @@
                     </a:lnBlToTr>
                   </a:tcPr>
                 </a:tc>
+                <a:extLst>
+                  <a:ext uri="{0D108BD9-81ED-4DB2-BD59-A6C34878D82A}">
+                    <a16:rowId xmlns:a16="http://schemas.microsoft.com/office/drawing/2014/main" val="10003"/>
+                  </a:ext>
+                </a:extLst>
               </a:tr>
             </a:tbl>
           </a:graphicData>
@@ -19776,13 +19996,13 @@
   <p:clrMapOvr>
     <a:masterClrMapping/>
   </p:clrMapOvr>
-  <mc:AlternateContent xmlns:mc="http://schemas.openxmlformats.org/markup-compatibility/2006">
-    <mc:Choice xmlns:p14="http://schemas.microsoft.com/office/powerpoint/2010/main" Requires="p14">
+  <mc:AlternateContent xmlns:mc="http://schemas.openxmlformats.org/markup-compatibility/2006" xmlns:p14="http://schemas.microsoft.com/office/powerpoint/2010/main">
+    <mc:Choice Requires="p14">
       <p:transition spd="med" p14:dur="700">
         <p:fade/>
       </p:transition>
     </mc:Choice>
-    <mc:Fallback>
+    <mc:Fallback xmlns="">
       <p:transition spd="med">
         <p:fade/>
       </p:transition>
@@ -21086,13 +21306,13 @@
   <p:clrMapOvr>
     <a:masterClrMapping/>
   </p:clrMapOvr>
-  <mc:AlternateContent xmlns:mc="http://schemas.openxmlformats.org/markup-compatibility/2006">
-    <mc:Choice xmlns:p14="http://schemas.microsoft.com/office/powerpoint/2010/main" Requires="p14">
+  <mc:AlternateContent xmlns:mc="http://schemas.openxmlformats.org/markup-compatibility/2006" xmlns:p14="http://schemas.microsoft.com/office/powerpoint/2010/main">
+    <mc:Choice Requires="p14">
       <p:transition spd="med" p14:dur="700">
         <p:fade/>
       </p:transition>
     </mc:Choice>
-    <mc:Fallback>
+    <mc:Fallback xmlns="">
       <p:transition spd="med">
         <p:fade/>
       </p:transition>
@@ -21503,10 +21723,275 @@
           <a:chExt cx="0" cy="0"/>
         </a:xfrm>
       </p:grpSpPr>
+      <p:sp>
+        <p:nvSpPr>
+          <p:cNvPr id="2" name="Slide Number Placeholder 1"/>
+          <p:cNvSpPr>
+            <a:spLocks noGrp="1"/>
+          </p:cNvSpPr>
+          <p:nvPr>
+            <p:ph type="sldNum" sz="quarter" idx="12"/>
+          </p:nvPr>
+        </p:nvSpPr>
+        <p:spPr/>
+        <p:txBody>
+          <a:bodyPr/>
+          <a:lstStyle/>
+          <a:p>
+            <a:fld id="{0A164282-434E-41D4-9582-783D542A7B68}" type="slidenum">
+              <a:rPr lang="en-US" smtClean="0"/>
+              <a:t>16</a:t>
+            </a:fld>
+            <a:endParaRPr lang="en-US"/>
+          </a:p>
+        </p:txBody>
+      </p:sp>
+      <p:sp>
+        <p:nvSpPr>
+          <p:cNvPr id="7" name="Title 2"/>
+          <p:cNvSpPr txBox="1">
+            <a:spLocks/>
+          </p:cNvSpPr>
+          <p:nvPr/>
+        </p:nvSpPr>
+        <p:spPr>
+          <a:xfrm>
+            <a:off x="606175" y="1122363"/>
+            <a:ext cx="11034445" cy="2387600"/>
+          </a:xfrm>
+          <a:prstGeom prst="rect">
+            <a:avLst/>
+          </a:prstGeom>
+        </p:spPr>
+        <p:txBody>
+          <a:bodyPr anchor="b"/>
+          <a:lstStyle>
+            <a:lvl1pPr algn="l" defTabSz="914400" rtl="0" eaLnBrk="1" latinLnBrk="0" hangingPunct="1">
+              <a:lnSpc>
+                <a:spcPct val="90000"/>
+              </a:lnSpc>
+              <a:spcBef>
+                <a:spcPct val="0"/>
+              </a:spcBef>
+              <a:buNone/>
+              <a:defRPr sz="5400" kern="1200">
+                <a:solidFill>
+                  <a:srgbClr val="289FD7"/>
+                </a:solidFill>
+                <a:latin typeface="+mj-lt"/>
+                <a:ea typeface="+mj-ea"/>
+                <a:cs typeface="+mj-cs"/>
+              </a:defRPr>
+            </a:lvl1pPr>
+          </a:lstStyle>
+          <a:p>
+            <a:r>
+              <a:rPr lang="en-US" dirty="0" smtClean="0"/>
+              <a:t>Web Jobs</a:t>
+            </a:r>
+            <a:endParaRPr lang="en-US" dirty="0"/>
+          </a:p>
+        </p:txBody>
+      </p:sp>
+      <p:sp>
+        <p:nvSpPr>
+          <p:cNvPr id="8" name="Subtitle 3"/>
+          <p:cNvSpPr txBox="1">
+            <a:spLocks/>
+          </p:cNvSpPr>
+          <p:nvPr/>
+        </p:nvSpPr>
+        <p:spPr>
+          <a:xfrm>
+            <a:off x="606175" y="3602038"/>
+            <a:ext cx="11034445" cy="1655762"/>
+          </a:xfrm>
+          <a:prstGeom prst="rect">
+            <a:avLst/>
+          </a:prstGeom>
+        </p:spPr>
+        <p:txBody>
+          <a:bodyPr/>
+          <a:lstStyle>
+            <a:lvl1pPr marL="228600" indent="-228600" algn="l" defTabSz="914400" rtl="0" eaLnBrk="1" latinLnBrk="0" hangingPunct="1">
+              <a:lnSpc>
+                <a:spcPct val="90000"/>
+              </a:lnSpc>
+              <a:spcBef>
+                <a:spcPts val="1000"/>
+              </a:spcBef>
+              <a:buFont typeface="Arial" panose="020B0604020202020204" pitchFamily="34" charset="0"/>
+              <a:buChar char="•"/>
+              <a:defRPr sz="3600" kern="1200">
+                <a:solidFill>
+                  <a:schemeClr val="bg1"/>
+                </a:solidFill>
+                <a:latin typeface="+mn-lt"/>
+                <a:ea typeface="+mn-ea"/>
+                <a:cs typeface="+mn-cs"/>
+              </a:defRPr>
+            </a:lvl1pPr>
+            <a:lvl2pPr marL="685800" indent="-228600" algn="l" defTabSz="914400" rtl="0" eaLnBrk="1" latinLnBrk="0" hangingPunct="1">
+              <a:lnSpc>
+                <a:spcPct val="90000"/>
+              </a:lnSpc>
+              <a:spcBef>
+                <a:spcPts val="500"/>
+              </a:spcBef>
+              <a:buFont typeface="Arial" panose="020B0604020202020204" pitchFamily="34" charset="0"/>
+              <a:buChar char="•"/>
+              <a:defRPr sz="3200" kern="1200">
+                <a:solidFill>
+                  <a:schemeClr val="bg1"/>
+                </a:solidFill>
+                <a:latin typeface="+mn-lt"/>
+                <a:ea typeface="+mn-ea"/>
+                <a:cs typeface="+mn-cs"/>
+              </a:defRPr>
+            </a:lvl2pPr>
+            <a:lvl3pPr marL="1143000" indent="-228600" algn="l" defTabSz="914400" rtl="0" eaLnBrk="1" latinLnBrk="0" hangingPunct="1">
+              <a:lnSpc>
+                <a:spcPct val="90000"/>
+              </a:lnSpc>
+              <a:spcBef>
+                <a:spcPts val="500"/>
+              </a:spcBef>
+              <a:buFont typeface="Arial" panose="020B0604020202020204" pitchFamily="34" charset="0"/>
+              <a:buChar char="•"/>
+              <a:defRPr sz="2800" kern="1200">
+                <a:solidFill>
+                  <a:schemeClr val="bg1"/>
+                </a:solidFill>
+                <a:latin typeface="+mn-lt"/>
+                <a:ea typeface="+mn-ea"/>
+                <a:cs typeface="+mn-cs"/>
+              </a:defRPr>
+            </a:lvl3pPr>
+            <a:lvl4pPr marL="1600200" indent="-228600" algn="l" defTabSz="914400" rtl="0" eaLnBrk="1" latinLnBrk="0" hangingPunct="1">
+              <a:lnSpc>
+                <a:spcPct val="90000"/>
+              </a:lnSpc>
+              <a:spcBef>
+                <a:spcPts val="500"/>
+              </a:spcBef>
+              <a:buFont typeface="Arial" panose="020B0604020202020204" pitchFamily="34" charset="0"/>
+              <a:buChar char="•"/>
+              <a:defRPr sz="2400" kern="1200">
+                <a:solidFill>
+                  <a:schemeClr val="bg1"/>
+                </a:solidFill>
+                <a:latin typeface="+mn-lt"/>
+                <a:ea typeface="+mn-ea"/>
+                <a:cs typeface="+mn-cs"/>
+              </a:defRPr>
+            </a:lvl4pPr>
+            <a:lvl5pPr marL="2057400" indent="-228600" algn="l" defTabSz="914400" rtl="0" eaLnBrk="1" latinLnBrk="0" hangingPunct="1">
+              <a:lnSpc>
+                <a:spcPct val="90000"/>
+              </a:lnSpc>
+              <a:spcBef>
+                <a:spcPts val="500"/>
+              </a:spcBef>
+              <a:buFont typeface="Arial" panose="020B0604020202020204" pitchFamily="34" charset="0"/>
+              <a:buChar char="•"/>
+              <a:defRPr sz="2400" kern="1200">
+                <a:solidFill>
+                  <a:schemeClr val="bg1"/>
+                </a:solidFill>
+                <a:latin typeface="+mn-lt"/>
+                <a:ea typeface="+mn-ea"/>
+                <a:cs typeface="+mn-cs"/>
+              </a:defRPr>
+            </a:lvl5pPr>
+            <a:lvl6pPr marL="2514600" indent="-228600" algn="l" defTabSz="914400" rtl="0" eaLnBrk="1" latinLnBrk="0" hangingPunct="1">
+              <a:lnSpc>
+                <a:spcPct val="90000"/>
+              </a:lnSpc>
+              <a:spcBef>
+                <a:spcPts val="500"/>
+              </a:spcBef>
+              <a:buFont typeface="Arial" panose="020B0604020202020204" pitchFamily="34" charset="0"/>
+              <a:buChar char="•"/>
+              <a:defRPr sz="1800" kern="1200">
+                <a:solidFill>
+                  <a:schemeClr val="tx1"/>
+                </a:solidFill>
+                <a:latin typeface="+mn-lt"/>
+                <a:ea typeface="+mn-ea"/>
+                <a:cs typeface="+mn-cs"/>
+              </a:defRPr>
+            </a:lvl6pPr>
+            <a:lvl7pPr marL="2971800" indent="-228600" algn="l" defTabSz="914400" rtl="0" eaLnBrk="1" latinLnBrk="0" hangingPunct="1">
+              <a:lnSpc>
+                <a:spcPct val="90000"/>
+              </a:lnSpc>
+              <a:spcBef>
+                <a:spcPts val="500"/>
+              </a:spcBef>
+              <a:buFont typeface="Arial" panose="020B0604020202020204" pitchFamily="34" charset="0"/>
+              <a:buChar char="•"/>
+              <a:defRPr sz="1800" kern="1200">
+                <a:solidFill>
+                  <a:schemeClr val="tx1"/>
+                </a:solidFill>
+                <a:latin typeface="+mn-lt"/>
+                <a:ea typeface="+mn-ea"/>
+                <a:cs typeface="+mn-cs"/>
+              </a:defRPr>
+            </a:lvl7pPr>
+            <a:lvl8pPr marL="3429000" indent="-228600" algn="l" defTabSz="914400" rtl="0" eaLnBrk="1" latinLnBrk="0" hangingPunct="1">
+              <a:lnSpc>
+                <a:spcPct val="90000"/>
+              </a:lnSpc>
+              <a:spcBef>
+                <a:spcPts val="500"/>
+              </a:spcBef>
+              <a:buFont typeface="Arial" panose="020B0604020202020204" pitchFamily="34" charset="0"/>
+              <a:buChar char="•"/>
+              <a:defRPr sz="1800" kern="1200">
+                <a:solidFill>
+                  <a:schemeClr val="tx1"/>
+                </a:solidFill>
+                <a:latin typeface="+mn-lt"/>
+                <a:ea typeface="+mn-ea"/>
+                <a:cs typeface="+mn-cs"/>
+              </a:defRPr>
+            </a:lvl8pPr>
+            <a:lvl9pPr marL="3886200" indent="-228600" algn="l" defTabSz="914400" rtl="0" eaLnBrk="1" latinLnBrk="0" hangingPunct="1">
+              <a:lnSpc>
+                <a:spcPct val="90000"/>
+              </a:lnSpc>
+              <a:spcBef>
+                <a:spcPts val="500"/>
+              </a:spcBef>
+              <a:buFont typeface="Arial" panose="020B0604020202020204" pitchFamily="34" charset="0"/>
+              <a:buChar char="•"/>
+              <a:defRPr sz="1800" kern="1200">
+                <a:solidFill>
+                  <a:schemeClr val="tx1"/>
+                </a:solidFill>
+                <a:latin typeface="+mn-lt"/>
+                <a:ea typeface="+mn-ea"/>
+                <a:cs typeface="+mn-cs"/>
+              </a:defRPr>
+            </a:lvl9pPr>
+          </a:lstStyle>
+          <a:p>
+            <a:pPr marL="0" indent="0">
+              <a:buNone/>
+            </a:pPr>
+            <a:r>
+              <a:rPr lang="en-US" dirty="0" smtClean="0"/>
+              <a:t>Demo</a:t>
+            </a:r>
+            <a:endParaRPr lang="en-US" dirty="0"/>
+          </a:p>
+        </p:txBody>
+      </p:sp>
     </p:spTree>
     <p:extLst>
       <p:ext uri="{BB962C8B-B14F-4D97-AF65-F5344CB8AC3E}">
-        <p14:creationId xmlns:p14="http://schemas.microsoft.com/office/powerpoint/2010/main" val="2128875082"/>
+        <p14:creationId xmlns:p14="http://schemas.microsoft.com/office/powerpoint/2010/main" val="1866639590"/>
       </p:ext>
     </p:extLst>
   </p:cSld>
@@ -21717,9 +22202,9 @@
         <p:grpSpPr>
           <a:xfrm>
             <a:off x="976622" y="4187425"/>
-            <a:ext cx="3340574" cy="1378749"/>
+            <a:ext cx="3376033" cy="1378749"/>
             <a:chOff x="976622" y="3810498"/>
-            <a:chExt cx="3340574" cy="1378749"/>
+            <a:chExt cx="3376033" cy="1378749"/>
           </a:xfrm>
         </p:grpSpPr>
         <p:grpSp>
@@ -21731,9 +22216,9 @@
           <p:grpSpPr>
             <a:xfrm>
               <a:off x="1601516" y="3810498"/>
-              <a:ext cx="2715680" cy="1275852"/>
+              <a:ext cx="2751139" cy="1275852"/>
               <a:chOff x="1449116" y="4179830"/>
-              <a:chExt cx="2715680" cy="1275852"/>
+              <a:chExt cx="2751139" cy="1275852"/>
             </a:xfrm>
           </p:grpSpPr>
           <p:grpSp>
@@ -21745,9 +22230,9 @@
             <p:grpSpPr>
               <a:xfrm>
                 <a:off x="1799322" y="4179830"/>
-                <a:ext cx="2365474" cy="621792"/>
+                <a:ext cx="2400933" cy="621792"/>
                 <a:chOff x="816285" y="3200031"/>
-                <a:chExt cx="2365474" cy="621792"/>
+                <a:chExt cx="2400933" cy="621792"/>
               </a:xfrm>
             </p:grpSpPr>
             <p:pic>
@@ -21790,7 +22275,7 @@
               <p:spPr>
                 <a:xfrm>
                   <a:off x="1438077" y="3326261"/>
-                  <a:ext cx="1743682" cy="369332"/>
+                  <a:ext cx="1779141" cy="369332"/>
                 </a:xfrm>
                 <a:prstGeom prst="rect">
                   <a:avLst/>
@@ -21809,7 +22294,15 @@
                         <a:schemeClr val="bg1"/>
                       </a:solidFill>
                     </a:rPr>
-                    <a:t>Azure Websites</a:t>
+                    <a:t>Azure </a:t>
+                  </a:r>
+                  <a:r>
+                    <a:rPr lang="en-US" dirty="0" smtClean="0">
+                      <a:solidFill>
+                        <a:schemeClr val="bg1"/>
+                      </a:solidFill>
+                    </a:rPr>
+                    <a:t>Web App</a:t>
                   </a:r>
                   <a:endParaRPr lang="en-US" dirty="0">
                     <a:solidFill>
@@ -22161,8 +22654,41 @@
                 <a:ea typeface="Segoe UI" pitchFamily="34" charset="0"/>
                 <a:cs typeface="Segoe UI" pitchFamily="34" charset="0"/>
               </a:rPr>
-              <a:t>Azure Web Site</a:t>
+              <a:t>Azure Web </a:t>
             </a:r>
+            <a:r>
+              <a:rPr lang="en-US" sz="2400" dirty="0" smtClean="0">
+                <a:gradFill>
+                  <a:gsLst>
+                    <a:gs pos="0">
+                      <a:srgbClr val="FFFFFF"/>
+                    </a:gs>
+                    <a:gs pos="100000">
+                      <a:srgbClr val="FFFFFF"/>
+                    </a:gs>
+                  </a:gsLst>
+                  <a:lin ang="5400000" scaled="0"/>
+                </a:gradFill>
+                <a:ea typeface="Segoe UI" pitchFamily="34" charset="0"/>
+                <a:cs typeface="Segoe UI" pitchFamily="34" charset="0"/>
+              </a:rPr>
+              <a:t>App</a:t>
+            </a:r>
+            <a:endParaRPr lang="en-US" sz="2400" dirty="0" smtClean="0">
+              <a:gradFill>
+                <a:gsLst>
+                  <a:gs pos="0">
+                    <a:srgbClr val="FFFFFF"/>
+                  </a:gs>
+                  <a:gs pos="100000">
+                    <a:srgbClr val="FFFFFF"/>
+                  </a:gs>
+                </a:gsLst>
+                <a:lin ang="5400000" scaled="0"/>
+              </a:gradFill>
+              <a:ea typeface="Segoe UI" pitchFamily="34" charset="0"/>
+              <a:cs typeface="Segoe UI" pitchFamily="34" charset="0"/>
+            </a:endParaRPr>
           </a:p>
         </p:txBody>
       </p:sp>
@@ -24092,7 +24618,15 @@
                   <a:schemeClr val="bg1"/>
                 </a:solidFill>
               </a:rPr>
-              <a:t> Anatomy of a Website</a:t>
+              <a:t> Anatomy of a </a:t>
+            </a:r>
+            <a:r>
+              <a:rPr lang="en-US" sz="4800" dirty="0" smtClean="0">
+                <a:solidFill>
+                  <a:schemeClr val="bg1"/>
+                </a:solidFill>
+              </a:rPr>
+              <a:t>Web App</a:t>
             </a:r>
             <a:endParaRPr lang="en-US" sz="4800" dirty="0">
               <a:solidFill>

</xml_diff>